<commit_message>
agregado de analisis MAE
</commit_message>
<xml_diff>
--- a/Documentación/EcoTaxisNYC_Sp3.pptx
+++ b/Documentación/EcoTaxisNYC_Sp3.pptx
@@ -248,8 +248,11 @@
     </a:lvl9pPr>
   </p:defaultTextStyle>
   <p:extLst>
+    <p:ext uri="{EFAFB233-063F-42B5-8137-9DF3F51BA10A}">
+      <p15:sldGuideLst xmlns:p15="http://schemas.microsoft.com/office/powerpoint/2012/main"/>
+    </p:ext>
     <p:ext uri="GoogleSlidesCustomDataVersion2">
-      <go:slidesCustomData xmlns:go="http://customooxmlschemas.google.com/" xmlns:ahyp="http://schemas.microsoft.com/office/drawing/2018/hyperlinkcolor" xmlns:p15="http://schemas.microsoft.com/office/powerpoint/2012/main" xmlns:p14="http://schemas.microsoft.com/office/powerpoint/2010/main" xmlns:com="http://schemas.openxmlformats.org/drawingml/2006/compatibility" xmlns:pvml="urn:schemas-microsoft-com:office:powerpoint" xmlns:v="urn:schemas-microsoft-com:vml" xmlns:o="urn:schemas-microsoft-com:office:office" xmlns:dgm="http://schemas.openxmlformats.org/drawingml/2006/diagram" xmlns:c="http://schemas.openxmlformats.org/drawingml/2006/chart" xmlns:mv="urn:schemas-microsoft-com:mac:vml" xmlns:mc="http://schemas.openxmlformats.org/markup-compatibility/2006" xmlns="" r:id="rId20" roundtripDataSignature="AMtx7miE39EbOY5eG9GvrdOcohXQtPG4sw=="/>
+      <go:slidesCustomData xmlns="" xmlns:mc="http://schemas.openxmlformats.org/markup-compatibility/2006" xmlns:mv="urn:schemas-microsoft-com:mac:vml" xmlns:c="http://schemas.openxmlformats.org/drawingml/2006/chart" xmlns:dgm="http://schemas.openxmlformats.org/drawingml/2006/diagram" xmlns:o="urn:schemas-microsoft-com:office:office" xmlns:v="urn:schemas-microsoft-com:vml" xmlns:pvml="urn:schemas-microsoft-com:office:powerpoint" xmlns:com="http://schemas.openxmlformats.org/drawingml/2006/compatibility" xmlns:p14="http://schemas.microsoft.com/office/powerpoint/2010/main" xmlns:p15="http://schemas.microsoft.com/office/powerpoint/2012/main" xmlns:ahyp="http://schemas.microsoft.com/office/drawing/2018/hyperlinkcolor" xmlns:go="http://customooxmlschemas.google.com/" r:id="rId20" roundtripDataSignature="AMtx7miE39EbOY5eG9GvrdOcohXQtPG4sw=="/>
     </p:ext>
   </p:extLst>
 </p:presentation>
@@ -13855,8 +13858,8 @@
         </p:nvSpPr>
         <p:spPr>
           <a:xfrm>
-            <a:off x="1165214" y="896799"/>
-            <a:ext cx="9861572" cy="2308324"/>
+            <a:off x="1165214" y="649911"/>
+            <a:ext cx="9861572" cy="2862322"/>
           </a:xfrm>
           <a:prstGeom prst="rect">
             <a:avLst/>
@@ -13883,6 +13886,72 @@
                 </a:solidFill>
               </a:rPr>
               <a:t>Entrenar al modelo con más datos: capturar tendencias en días festivos con más precisión.</a:t>
+            </a:r>
+          </a:p>
+          <a:p>
+            <a:pPr marL="342900" indent="-342900" algn="just">
+              <a:buClr>
+                <a:schemeClr val="bg1"/>
+              </a:buClr>
+              <a:buFont typeface="+mj-lt"/>
+              <a:buAutoNum type="arabicPeriod"/>
+            </a:pPr>
+            <a:r>
+              <a:rPr lang="es-AR" sz="1800" dirty="0">
+                <a:solidFill>
+                  <a:schemeClr val="bg1"/>
+                </a:solidFill>
+              </a:rPr>
+              <a:t>Realizar ajustes/mejoras en la arquitectura de la red neuronal.</a:t>
+            </a:r>
+          </a:p>
+          <a:p>
+            <a:pPr marL="342900" indent="-342900" algn="just">
+              <a:buClr>
+                <a:schemeClr val="bg1"/>
+              </a:buClr>
+              <a:buFont typeface="+mj-lt"/>
+              <a:buAutoNum type="arabicPeriod"/>
+            </a:pPr>
+            <a:r>
+              <a:rPr lang="es-AR" sz="1800" dirty="0">
+                <a:solidFill>
+                  <a:schemeClr val="bg1"/>
+                </a:solidFill>
+              </a:rPr>
+              <a:t>Incluir otros modelos: </a:t>
+            </a:r>
+            <a:r>
+              <a:rPr lang="es-AR" sz="1800" dirty="0" err="1">
+                <a:solidFill>
+                  <a:schemeClr val="bg1"/>
+                </a:solidFill>
+              </a:rPr>
+              <a:t>Sarimax</a:t>
+            </a:r>
+            <a:r>
+              <a:rPr lang="es-AR" sz="1800" dirty="0">
+                <a:solidFill>
+                  <a:schemeClr val="bg1"/>
+                </a:solidFill>
+              </a:rPr>
+              <a:t>, </a:t>
+            </a:r>
+            <a:r>
+              <a:rPr lang="es-AR" sz="1800" dirty="0" err="1">
+                <a:solidFill>
+                  <a:schemeClr val="bg1"/>
+                </a:solidFill>
+              </a:rPr>
+              <a:t>Prophet</a:t>
+            </a:r>
+            <a:r>
+              <a:rPr lang="es-AR" sz="1800" dirty="0">
+                <a:solidFill>
+                  <a:schemeClr val="bg1"/>
+                </a:solidFill>
+              </a:rPr>
+              <a:t>.</a:t>
             </a:r>
           </a:p>
           <a:p>
@@ -14028,7 +14097,7 @@
         </p:nvSpPr>
         <p:spPr>
           <a:xfrm>
-            <a:off x="731862" y="3379106"/>
+            <a:off x="731862" y="3507122"/>
             <a:ext cx="10728300" cy="720000"/>
           </a:xfrm>
           <a:prstGeom prst="rect">

</xml_diff>